<commit_message>
Update cohort transition diagram by inserting input variables next to the initialisation node
</commit_message>
<xml_diff>
--- a/documents/odd/figures/IRIS_cohort_transitions.pptx
+++ b/documents/odd/figures/IRIS_cohort_transitions.pptx
@@ -4,8 +4,11 @@
   <p:sldMasterIdLst>
     <p:sldMasterId id="2147483648" r:id="rId1"/>
   </p:sldMasterIdLst>
+  <p:notesMasterIdLst>
+    <p:notesMasterId r:id="rId3"/>
+  </p:notesMasterIdLst>
   <p:sldIdLst>
-    <p:sldId id="258" r:id="rId2"/>
+    <p:sldId id="259" r:id="rId2"/>
   </p:sldIdLst>
   <p:sldSz cx="12192000" cy="6858000"/>
   <p:notesSz cx="6858000" cy="9144000"/>
@@ -112,6 +115,440 @@
 </p:presentation>
 </file>
 
+<file path=ppt/notesMasters/notesMaster1.xml><?xml version="1.0" encoding="utf-8"?>
+<p:notesMaster xmlns:a="http://schemas.openxmlformats.org/drawingml/2006/main" xmlns:r="http://schemas.openxmlformats.org/officeDocument/2006/relationships" xmlns:p="http://schemas.openxmlformats.org/presentationml/2006/main">
+  <p:cSld>
+    <p:bg>
+      <p:bgRef idx="1001">
+        <a:schemeClr val="bg1"/>
+      </p:bgRef>
+    </p:bg>
+    <p:spTree>
+      <p:nvGrpSpPr>
+        <p:cNvPr id="1" name=""/>
+        <p:cNvGrpSpPr/>
+        <p:nvPr/>
+      </p:nvGrpSpPr>
+      <p:grpSpPr>
+        <a:xfrm>
+          <a:off x="0" y="0"/>
+          <a:ext cx="0" cy="0"/>
+          <a:chOff x="0" y="0"/>
+          <a:chExt cx="0" cy="0"/>
+        </a:xfrm>
+      </p:grpSpPr>
+      <p:sp>
+        <p:nvSpPr>
+          <p:cNvPr id="2" name="Kopfzeilenplatzhalter 1"/>
+          <p:cNvSpPr>
+            <a:spLocks noGrp="1"/>
+          </p:cNvSpPr>
+          <p:nvPr>
+            <p:ph type="hdr" sz="quarter"/>
+          </p:nvPr>
+        </p:nvSpPr>
+        <p:spPr>
+          <a:xfrm>
+            <a:off x="0" y="0"/>
+            <a:ext cx="2971800" cy="458788"/>
+          </a:xfrm>
+          <a:prstGeom prst="rect">
+            <a:avLst/>
+          </a:prstGeom>
+        </p:spPr>
+        <p:txBody>
+          <a:bodyPr vert="horz" lIns="91440" tIns="45720" rIns="91440" bIns="45720" rtlCol="0"/>
+          <a:lstStyle>
+            <a:lvl1pPr algn="l">
+              <a:defRPr sz="1200"/>
+            </a:lvl1pPr>
+          </a:lstStyle>
+          <a:p>
+            <a:endParaRPr lang="de-DE"/>
+          </a:p>
+        </p:txBody>
+      </p:sp>
+      <p:sp>
+        <p:nvSpPr>
+          <p:cNvPr id="3" name="Datumsplatzhalter 2"/>
+          <p:cNvSpPr>
+            <a:spLocks noGrp="1"/>
+          </p:cNvSpPr>
+          <p:nvPr>
+            <p:ph type="dt" idx="1"/>
+          </p:nvPr>
+        </p:nvSpPr>
+        <p:spPr>
+          <a:xfrm>
+            <a:off x="3884613" y="0"/>
+            <a:ext cx="2971800" cy="458788"/>
+          </a:xfrm>
+          <a:prstGeom prst="rect">
+            <a:avLst/>
+          </a:prstGeom>
+        </p:spPr>
+        <p:txBody>
+          <a:bodyPr vert="horz" lIns="91440" tIns="45720" rIns="91440" bIns="45720" rtlCol="0"/>
+          <a:lstStyle>
+            <a:lvl1pPr algn="r">
+              <a:defRPr sz="1200"/>
+            </a:lvl1pPr>
+          </a:lstStyle>
+          <a:p>
+            <a:fld id="{8600AF63-48BF-415F-BCFF-13DC854248F9}" type="datetimeFigureOut">
+              <a:rPr lang="de-DE" smtClean="0"/>
+              <a:t>04.11.2021</a:t>
+            </a:fld>
+            <a:endParaRPr lang="de-DE"/>
+          </a:p>
+        </p:txBody>
+      </p:sp>
+      <p:sp>
+        <p:nvSpPr>
+          <p:cNvPr id="4" name="Folienbildplatzhalter 3"/>
+          <p:cNvSpPr>
+            <a:spLocks noGrp="1" noRot="1" noChangeAspect="1"/>
+          </p:cNvSpPr>
+          <p:nvPr>
+            <p:ph type="sldImg" idx="2"/>
+          </p:nvPr>
+        </p:nvSpPr>
+        <p:spPr>
+          <a:xfrm>
+            <a:off x="685800" y="1143000"/>
+            <a:ext cx="5486400" cy="3086100"/>
+          </a:xfrm>
+          <a:prstGeom prst="rect">
+            <a:avLst/>
+          </a:prstGeom>
+          <a:noFill/>
+          <a:ln w="12700">
+            <a:solidFill>
+              <a:prstClr val="black"/>
+            </a:solidFill>
+          </a:ln>
+        </p:spPr>
+        <p:txBody>
+          <a:bodyPr vert="horz" lIns="91440" tIns="45720" rIns="91440" bIns="45720" rtlCol="0" anchor="ctr"/>
+          <a:lstStyle/>
+          <a:p>
+            <a:endParaRPr lang="de-DE"/>
+          </a:p>
+        </p:txBody>
+      </p:sp>
+      <p:sp>
+        <p:nvSpPr>
+          <p:cNvPr id="5" name="Notizenplatzhalter 4"/>
+          <p:cNvSpPr>
+            <a:spLocks noGrp="1"/>
+          </p:cNvSpPr>
+          <p:nvPr>
+            <p:ph type="body" sz="quarter" idx="3"/>
+          </p:nvPr>
+        </p:nvSpPr>
+        <p:spPr>
+          <a:xfrm>
+            <a:off x="685800" y="4400550"/>
+            <a:ext cx="5486400" cy="3600450"/>
+          </a:xfrm>
+          <a:prstGeom prst="rect">
+            <a:avLst/>
+          </a:prstGeom>
+        </p:spPr>
+        <p:txBody>
+          <a:bodyPr vert="horz" lIns="91440" tIns="45720" rIns="91440" bIns="45720" rtlCol="0"/>
+          <a:lstStyle/>
+          <a:p>
+            <a:pPr lvl="0"/>
+            <a:r>
+              <a:rPr lang="de-DE" smtClean="0"/>
+              <a:t>Textmasterformat bearbeiten</a:t>
+            </a:r>
+          </a:p>
+          <a:p>
+            <a:pPr lvl="1"/>
+            <a:r>
+              <a:rPr lang="de-DE" smtClean="0"/>
+              <a:t>Zweite Ebene</a:t>
+            </a:r>
+          </a:p>
+          <a:p>
+            <a:pPr lvl="2"/>
+            <a:r>
+              <a:rPr lang="de-DE" smtClean="0"/>
+              <a:t>Dritte Ebene</a:t>
+            </a:r>
+          </a:p>
+          <a:p>
+            <a:pPr lvl="3"/>
+            <a:r>
+              <a:rPr lang="de-DE" smtClean="0"/>
+              <a:t>Vierte Ebene</a:t>
+            </a:r>
+          </a:p>
+          <a:p>
+            <a:pPr lvl="4"/>
+            <a:r>
+              <a:rPr lang="de-DE" smtClean="0"/>
+              <a:t>Fünfte Ebene</a:t>
+            </a:r>
+            <a:endParaRPr lang="de-DE"/>
+          </a:p>
+        </p:txBody>
+      </p:sp>
+      <p:sp>
+        <p:nvSpPr>
+          <p:cNvPr id="6" name="Fußzeilenplatzhalter 5"/>
+          <p:cNvSpPr>
+            <a:spLocks noGrp="1"/>
+          </p:cNvSpPr>
+          <p:nvPr>
+            <p:ph type="ftr" sz="quarter" idx="4"/>
+          </p:nvPr>
+        </p:nvSpPr>
+        <p:spPr>
+          <a:xfrm>
+            <a:off x="0" y="8685213"/>
+            <a:ext cx="2971800" cy="458787"/>
+          </a:xfrm>
+          <a:prstGeom prst="rect">
+            <a:avLst/>
+          </a:prstGeom>
+        </p:spPr>
+        <p:txBody>
+          <a:bodyPr vert="horz" lIns="91440" tIns="45720" rIns="91440" bIns="45720" rtlCol="0" anchor="b"/>
+          <a:lstStyle>
+            <a:lvl1pPr algn="l">
+              <a:defRPr sz="1200"/>
+            </a:lvl1pPr>
+          </a:lstStyle>
+          <a:p>
+            <a:endParaRPr lang="de-DE"/>
+          </a:p>
+        </p:txBody>
+      </p:sp>
+      <p:sp>
+        <p:nvSpPr>
+          <p:cNvPr id="7" name="Foliennummernplatzhalter 6"/>
+          <p:cNvSpPr>
+            <a:spLocks noGrp="1"/>
+          </p:cNvSpPr>
+          <p:nvPr>
+            <p:ph type="sldNum" sz="quarter" idx="5"/>
+          </p:nvPr>
+        </p:nvSpPr>
+        <p:spPr>
+          <a:xfrm>
+            <a:off x="3884613" y="8685213"/>
+            <a:ext cx="2971800" cy="458787"/>
+          </a:xfrm>
+          <a:prstGeom prst="rect">
+            <a:avLst/>
+          </a:prstGeom>
+        </p:spPr>
+        <p:txBody>
+          <a:bodyPr vert="horz" lIns="91440" tIns="45720" rIns="91440" bIns="45720" rtlCol="0" anchor="b"/>
+          <a:lstStyle>
+            <a:lvl1pPr algn="r">
+              <a:defRPr sz="1200"/>
+            </a:lvl1pPr>
+          </a:lstStyle>
+          <a:p>
+            <a:fld id="{C1751C3C-4E45-4D55-8A28-47817DFDC33B}" type="slidenum">
+              <a:rPr lang="de-DE" smtClean="0"/>
+              <a:t>‹Nr.›</a:t>
+            </a:fld>
+            <a:endParaRPr lang="de-DE"/>
+          </a:p>
+        </p:txBody>
+      </p:sp>
+    </p:spTree>
+    <p:extLst>
+      <p:ext uri="{BB962C8B-B14F-4D97-AF65-F5344CB8AC3E}">
+        <p14:creationId xmlns:p14="http://schemas.microsoft.com/office/powerpoint/2010/main" val="4106628410"/>
+      </p:ext>
+    </p:extLst>
+  </p:cSld>
+  <p:clrMap bg1="lt1" tx1="dk1" bg2="lt2" tx2="dk2" accent1="accent1" accent2="accent2" accent3="accent3" accent4="accent4" accent5="accent5" accent6="accent6" hlink="hlink" folHlink="folHlink"/>
+  <p:notesStyle>
+    <a:lvl1pPr marL="0" algn="l" defTabSz="914400" rtl="0" eaLnBrk="1" latinLnBrk="0" hangingPunct="1">
+      <a:defRPr sz="1200" kern="1200">
+        <a:solidFill>
+          <a:schemeClr val="tx1"/>
+        </a:solidFill>
+        <a:latin typeface="+mn-lt"/>
+        <a:ea typeface="+mn-ea"/>
+        <a:cs typeface="+mn-cs"/>
+      </a:defRPr>
+    </a:lvl1pPr>
+    <a:lvl2pPr marL="457200" algn="l" defTabSz="914400" rtl="0" eaLnBrk="1" latinLnBrk="0" hangingPunct="1">
+      <a:defRPr sz="1200" kern="1200">
+        <a:solidFill>
+          <a:schemeClr val="tx1"/>
+        </a:solidFill>
+        <a:latin typeface="+mn-lt"/>
+        <a:ea typeface="+mn-ea"/>
+        <a:cs typeface="+mn-cs"/>
+      </a:defRPr>
+    </a:lvl2pPr>
+    <a:lvl3pPr marL="914400" algn="l" defTabSz="914400" rtl="0" eaLnBrk="1" latinLnBrk="0" hangingPunct="1">
+      <a:defRPr sz="1200" kern="1200">
+        <a:solidFill>
+          <a:schemeClr val="tx1"/>
+        </a:solidFill>
+        <a:latin typeface="+mn-lt"/>
+        <a:ea typeface="+mn-ea"/>
+        <a:cs typeface="+mn-cs"/>
+      </a:defRPr>
+    </a:lvl3pPr>
+    <a:lvl4pPr marL="1371600" algn="l" defTabSz="914400" rtl="0" eaLnBrk="1" latinLnBrk="0" hangingPunct="1">
+      <a:defRPr sz="1200" kern="1200">
+        <a:solidFill>
+          <a:schemeClr val="tx1"/>
+        </a:solidFill>
+        <a:latin typeface="+mn-lt"/>
+        <a:ea typeface="+mn-ea"/>
+        <a:cs typeface="+mn-cs"/>
+      </a:defRPr>
+    </a:lvl4pPr>
+    <a:lvl5pPr marL="1828800" algn="l" defTabSz="914400" rtl="0" eaLnBrk="1" latinLnBrk="0" hangingPunct="1">
+      <a:defRPr sz="1200" kern="1200">
+        <a:solidFill>
+          <a:schemeClr val="tx1"/>
+        </a:solidFill>
+        <a:latin typeface="+mn-lt"/>
+        <a:ea typeface="+mn-ea"/>
+        <a:cs typeface="+mn-cs"/>
+      </a:defRPr>
+    </a:lvl5pPr>
+    <a:lvl6pPr marL="2286000" algn="l" defTabSz="914400" rtl="0" eaLnBrk="1" latinLnBrk="0" hangingPunct="1">
+      <a:defRPr sz="1200" kern="1200">
+        <a:solidFill>
+          <a:schemeClr val="tx1"/>
+        </a:solidFill>
+        <a:latin typeface="+mn-lt"/>
+        <a:ea typeface="+mn-ea"/>
+        <a:cs typeface="+mn-cs"/>
+      </a:defRPr>
+    </a:lvl6pPr>
+    <a:lvl7pPr marL="2743200" algn="l" defTabSz="914400" rtl="0" eaLnBrk="1" latinLnBrk="0" hangingPunct="1">
+      <a:defRPr sz="1200" kern="1200">
+        <a:solidFill>
+          <a:schemeClr val="tx1"/>
+        </a:solidFill>
+        <a:latin typeface="+mn-lt"/>
+        <a:ea typeface="+mn-ea"/>
+        <a:cs typeface="+mn-cs"/>
+      </a:defRPr>
+    </a:lvl7pPr>
+    <a:lvl8pPr marL="3200400" algn="l" defTabSz="914400" rtl="0" eaLnBrk="1" latinLnBrk="0" hangingPunct="1">
+      <a:defRPr sz="1200" kern="1200">
+        <a:solidFill>
+          <a:schemeClr val="tx1"/>
+        </a:solidFill>
+        <a:latin typeface="+mn-lt"/>
+        <a:ea typeface="+mn-ea"/>
+        <a:cs typeface="+mn-cs"/>
+      </a:defRPr>
+    </a:lvl8pPr>
+    <a:lvl9pPr marL="3657600" algn="l" defTabSz="914400" rtl="0" eaLnBrk="1" latinLnBrk="0" hangingPunct="1">
+      <a:defRPr sz="1200" kern="1200">
+        <a:solidFill>
+          <a:schemeClr val="tx1"/>
+        </a:solidFill>
+        <a:latin typeface="+mn-lt"/>
+        <a:ea typeface="+mn-ea"/>
+        <a:cs typeface="+mn-cs"/>
+      </a:defRPr>
+    </a:lvl9pPr>
+  </p:notesStyle>
+</p:notesMaster>
+</file>
+
+<file path=ppt/notesSlides/notesSlide1.xml><?xml version="1.0" encoding="utf-8"?>
+<p:notes xmlns:a="http://schemas.openxmlformats.org/drawingml/2006/main" xmlns:r="http://schemas.openxmlformats.org/officeDocument/2006/relationships" xmlns:p="http://schemas.openxmlformats.org/presentationml/2006/main">
+  <p:cSld>
+    <p:spTree>
+      <p:nvGrpSpPr>
+        <p:cNvPr id="1" name=""/>
+        <p:cNvGrpSpPr/>
+        <p:nvPr/>
+      </p:nvGrpSpPr>
+      <p:grpSpPr>
+        <a:xfrm>
+          <a:off x="0" y="0"/>
+          <a:ext cx="0" cy="0"/>
+          <a:chOff x="0" y="0"/>
+          <a:chExt cx="0" cy="0"/>
+        </a:xfrm>
+      </p:grpSpPr>
+      <p:sp>
+        <p:nvSpPr>
+          <p:cNvPr id="2" name="Folienbildplatzhalter 1"/>
+          <p:cNvSpPr>
+            <a:spLocks noGrp="1" noRot="1" noChangeAspect="1"/>
+          </p:cNvSpPr>
+          <p:nvPr>
+            <p:ph type="sldImg"/>
+          </p:nvPr>
+        </p:nvSpPr>
+        <p:spPr/>
+      </p:sp>
+      <p:sp>
+        <p:nvSpPr>
+          <p:cNvPr id="3" name="Notizenplatzhalter 2"/>
+          <p:cNvSpPr>
+            <a:spLocks noGrp="1"/>
+          </p:cNvSpPr>
+          <p:nvPr>
+            <p:ph type="body" idx="1"/>
+          </p:nvPr>
+        </p:nvSpPr>
+        <p:spPr/>
+        <p:txBody>
+          <a:bodyPr/>
+          <a:lstStyle/>
+          <a:p>
+            <a:endParaRPr lang="de-DE"/>
+          </a:p>
+        </p:txBody>
+      </p:sp>
+      <p:sp>
+        <p:nvSpPr>
+          <p:cNvPr id="4" name="Foliennummernplatzhalter 3"/>
+          <p:cNvSpPr>
+            <a:spLocks noGrp="1"/>
+          </p:cNvSpPr>
+          <p:nvPr>
+            <p:ph type="sldNum" sz="quarter" idx="10"/>
+          </p:nvPr>
+        </p:nvSpPr>
+        <p:spPr/>
+        <p:txBody>
+          <a:bodyPr/>
+          <a:lstStyle/>
+          <a:p>
+            <a:fld id="{C1751C3C-4E45-4D55-8A28-47817DFDC33B}" type="slidenum">
+              <a:rPr lang="de-DE" smtClean="0"/>
+              <a:t>1</a:t>
+            </a:fld>
+            <a:endParaRPr lang="de-DE"/>
+          </a:p>
+        </p:txBody>
+      </p:sp>
+    </p:spTree>
+    <p:extLst>
+      <p:ext uri="{BB962C8B-B14F-4D97-AF65-F5344CB8AC3E}">
+        <p14:creationId xmlns:p14="http://schemas.microsoft.com/office/powerpoint/2010/main" val="3732964176"/>
+      </p:ext>
+    </p:extLst>
+  </p:cSld>
+  <p:clrMapOvr>
+    <a:masterClrMapping/>
+  </p:clrMapOvr>
+</p:notes>
+</file>
+
 <file path=ppt/slideLayouts/slideLayout1.xml><?xml version="1.0" encoding="utf-8"?>
 <p:sldLayout xmlns:a="http://schemas.openxmlformats.org/drawingml/2006/main" xmlns:r="http://schemas.openxmlformats.org/officeDocument/2006/relationships" xmlns:p="http://schemas.openxmlformats.org/presentationml/2006/main" type="title" preserve="1">
   <p:cSld name="Titelfolie">
@@ -243,7 +680,7 @@
           <a:p>
             <a:fld id="{32496A64-BE39-45EA-A2CE-2789F47AA9EF}" type="datetimeFigureOut">
               <a:rPr lang="de-DE" smtClean="0"/>
-              <a:t>01.05.2021</a:t>
+              <a:t>04.11.2021</a:t>
             </a:fld>
             <a:endParaRPr lang="de-DE"/>
           </a:p>
@@ -413,7 +850,7 @@
           <a:p>
             <a:fld id="{32496A64-BE39-45EA-A2CE-2789F47AA9EF}" type="datetimeFigureOut">
               <a:rPr lang="de-DE" smtClean="0"/>
-              <a:t>01.05.2021</a:t>
+              <a:t>04.11.2021</a:t>
             </a:fld>
             <a:endParaRPr lang="de-DE"/>
           </a:p>
@@ -593,7 +1030,7 @@
           <a:p>
             <a:fld id="{32496A64-BE39-45EA-A2CE-2789F47AA9EF}" type="datetimeFigureOut">
               <a:rPr lang="de-DE" smtClean="0"/>
-              <a:t>01.05.2021</a:t>
+              <a:t>04.11.2021</a:t>
             </a:fld>
             <a:endParaRPr lang="de-DE"/>
           </a:p>
@@ -763,7 +1200,7 @@
           <a:p>
             <a:fld id="{32496A64-BE39-45EA-A2CE-2789F47AA9EF}" type="datetimeFigureOut">
               <a:rPr lang="de-DE" smtClean="0"/>
-              <a:t>01.05.2021</a:t>
+              <a:t>04.11.2021</a:t>
             </a:fld>
             <a:endParaRPr lang="de-DE"/>
           </a:p>
@@ -1009,7 +1446,7 @@
           <a:p>
             <a:fld id="{32496A64-BE39-45EA-A2CE-2789F47AA9EF}" type="datetimeFigureOut">
               <a:rPr lang="de-DE" smtClean="0"/>
-              <a:t>01.05.2021</a:t>
+              <a:t>04.11.2021</a:t>
             </a:fld>
             <a:endParaRPr lang="de-DE"/>
           </a:p>
@@ -1241,7 +1678,7 @@
           <a:p>
             <a:fld id="{32496A64-BE39-45EA-A2CE-2789F47AA9EF}" type="datetimeFigureOut">
               <a:rPr lang="de-DE" smtClean="0"/>
-              <a:t>01.05.2021</a:t>
+              <a:t>04.11.2021</a:t>
             </a:fld>
             <a:endParaRPr lang="de-DE"/>
           </a:p>
@@ -1608,7 +2045,7 @@
           <a:p>
             <a:fld id="{32496A64-BE39-45EA-A2CE-2789F47AA9EF}" type="datetimeFigureOut">
               <a:rPr lang="de-DE" smtClean="0"/>
-              <a:t>01.05.2021</a:t>
+              <a:t>04.11.2021</a:t>
             </a:fld>
             <a:endParaRPr lang="de-DE"/>
           </a:p>
@@ -1726,7 +2163,7 @@
           <a:p>
             <a:fld id="{32496A64-BE39-45EA-A2CE-2789F47AA9EF}" type="datetimeFigureOut">
               <a:rPr lang="de-DE" smtClean="0"/>
-              <a:t>01.05.2021</a:t>
+              <a:t>04.11.2021</a:t>
             </a:fld>
             <a:endParaRPr lang="de-DE"/>
           </a:p>
@@ -1821,7 +2258,7 @@
           <a:p>
             <a:fld id="{32496A64-BE39-45EA-A2CE-2789F47AA9EF}" type="datetimeFigureOut">
               <a:rPr lang="de-DE" smtClean="0"/>
-              <a:t>01.05.2021</a:t>
+              <a:t>04.11.2021</a:t>
             </a:fld>
             <a:endParaRPr lang="de-DE"/>
           </a:p>
@@ -2098,7 +2535,7 @@
           <a:p>
             <a:fld id="{32496A64-BE39-45EA-A2CE-2789F47AA9EF}" type="datetimeFigureOut">
               <a:rPr lang="de-DE" smtClean="0"/>
-              <a:t>01.05.2021</a:t>
+              <a:t>04.11.2021</a:t>
             </a:fld>
             <a:endParaRPr lang="de-DE"/>
           </a:p>
@@ -2351,7 +2788,7 @@
           <a:p>
             <a:fld id="{32496A64-BE39-45EA-A2CE-2789F47AA9EF}" type="datetimeFigureOut">
               <a:rPr lang="de-DE" smtClean="0"/>
-              <a:t>01.05.2021</a:t>
+              <a:t>04.11.2021</a:t>
             </a:fld>
             <a:endParaRPr lang="de-DE"/>
           </a:p>
@@ -2564,7 +3001,7 @@
           <a:p>
             <a:fld id="{32496A64-BE39-45EA-A2CE-2789F47AA9EF}" type="datetimeFigureOut">
               <a:rPr lang="de-DE" smtClean="0"/>
-              <a:t>01.05.2021</a:t>
+              <a:t>04.11.2021</a:t>
             </a:fld>
             <a:endParaRPr lang="de-DE"/>
           </a:p>
@@ -2977,7 +3414,7 @@
         </p:nvSpPr>
         <p:spPr>
           <a:xfrm>
-            <a:off x="7093961" y="1471131"/>
+            <a:off x="7217786" y="1471131"/>
             <a:ext cx="3007571" cy="1024060"/>
           </a:xfrm>
           <a:prstGeom prst="roundRect">
@@ -3028,7 +3465,7 @@
         </p:nvSpPr>
         <p:spPr>
           <a:xfrm>
-            <a:off x="7093961" y="3387312"/>
+            <a:off x="7217786" y="3387312"/>
             <a:ext cx="3007571" cy="1024060"/>
           </a:xfrm>
           <a:prstGeom prst="roundRect">
@@ -3079,7 +3516,7 @@
         </p:nvSpPr>
         <p:spPr>
           <a:xfrm>
-            <a:off x="3489872" y="4490761"/>
+            <a:off x="3613697" y="4490761"/>
             <a:ext cx="2637216" cy="1666838"/>
           </a:xfrm>
           <a:prstGeom prst="roundRect">
@@ -3130,7 +3567,7 @@
         </p:nvSpPr>
         <p:spPr>
           <a:xfrm>
-            <a:off x="3489871" y="2537869"/>
+            <a:off x="3613696" y="2537869"/>
             <a:ext cx="2637216" cy="1666838"/>
           </a:xfrm>
           <a:prstGeom prst="roundRect">
@@ -3181,7 +3618,7 @@
         </p:nvSpPr>
         <p:spPr>
           <a:xfrm>
-            <a:off x="3498550" y="620976"/>
+            <a:off x="3622375" y="620976"/>
             <a:ext cx="2637216" cy="1666838"/>
           </a:xfrm>
           <a:prstGeom prst="roundRect">
@@ -3232,7 +3669,7 @@
         </p:nvSpPr>
         <p:spPr>
           <a:xfrm>
-            <a:off x="3816244" y="1788441"/>
+            <a:off x="3940069" y="1788441"/>
             <a:ext cx="2002984" cy="369332"/>
           </a:xfrm>
           <a:prstGeom prst="rect">
@@ -3269,7 +3706,7 @@
         </p:nvSpPr>
         <p:spPr>
           <a:xfrm>
-            <a:off x="3762542" y="3711866"/>
+            <a:off x="3886367" y="3711866"/>
             <a:ext cx="2109232" cy="369332"/>
           </a:xfrm>
           <a:prstGeom prst="rect">
@@ -3306,7 +3743,7 @@
         </p:nvSpPr>
         <p:spPr>
           <a:xfrm>
-            <a:off x="3762542" y="5642759"/>
+            <a:off x="3886367" y="5642759"/>
             <a:ext cx="2109232" cy="369332"/>
           </a:xfrm>
           <a:prstGeom prst="rect">
@@ -3343,7 +3780,7 @@
         </p:nvSpPr>
         <p:spPr>
           <a:xfrm>
-            <a:off x="3816244" y="728776"/>
+            <a:off x="3940069" y="728776"/>
             <a:ext cx="2002984" cy="369332"/>
           </a:xfrm>
           <a:prstGeom prst="rect">
@@ -3380,7 +3817,7 @@
         </p:nvSpPr>
         <p:spPr>
           <a:xfrm>
-            <a:off x="3815377" y="2652259"/>
+            <a:off x="3939202" y="2652259"/>
             <a:ext cx="2003562" cy="369332"/>
           </a:xfrm>
           <a:prstGeom prst="rect">
@@ -3417,7 +3854,7 @@
         </p:nvSpPr>
         <p:spPr>
           <a:xfrm>
-            <a:off x="3763120" y="4623809"/>
+            <a:off x="3886945" y="4623809"/>
             <a:ext cx="2108654" cy="369332"/>
           </a:xfrm>
           <a:prstGeom prst="rect">
@@ -3454,7 +3891,7 @@
         </p:nvSpPr>
         <p:spPr>
           <a:xfrm>
-            <a:off x="7202995" y="1566771"/>
+            <a:off x="7326820" y="1566771"/>
             <a:ext cx="2765280" cy="369332"/>
           </a:xfrm>
           <a:prstGeom prst="rect">
@@ -3491,7 +3928,7 @@
         </p:nvSpPr>
         <p:spPr>
           <a:xfrm>
-            <a:off x="7230703" y="3499429"/>
+            <a:off x="7354528" y="3499429"/>
             <a:ext cx="2737572" cy="369332"/>
           </a:xfrm>
           <a:prstGeom prst="rect">
@@ -3528,7 +3965,7 @@
         </p:nvSpPr>
         <p:spPr>
           <a:xfrm>
-            <a:off x="7202995" y="5642759"/>
+            <a:off x="7326820" y="5642759"/>
             <a:ext cx="2737572" cy="369332"/>
           </a:xfrm>
           <a:prstGeom prst="rect">
@@ -3563,7 +4000,7 @@
         </p:nvSpPr>
         <p:spPr>
           <a:xfrm>
-            <a:off x="7230703" y="3951315"/>
+            <a:off x="7354528" y="3951315"/>
             <a:ext cx="2737572" cy="369332"/>
           </a:xfrm>
           <a:prstGeom prst="rect">
@@ -3600,7 +4037,7 @@
         </p:nvSpPr>
         <p:spPr>
           <a:xfrm>
-            <a:off x="7202995" y="2011159"/>
+            <a:off x="7326820" y="2011159"/>
             <a:ext cx="2765280" cy="369332"/>
           </a:xfrm>
           <a:prstGeom prst="rect">
@@ -3640,7 +4077,7 @@
         </p:nvCxnSpPr>
         <p:spPr>
           <a:xfrm>
-            <a:off x="5871774" y="3896532"/>
+            <a:off x="5995599" y="3896532"/>
             <a:ext cx="1222187" cy="2810"/>
           </a:xfrm>
           <a:prstGeom prst="straightConnector1">
@@ -3676,7 +4113,7 @@
         </p:nvCxnSpPr>
         <p:spPr>
           <a:xfrm flipV="1">
-            <a:off x="4619805" y="1126242"/>
+            <a:off x="4743630" y="1126242"/>
             <a:ext cx="0" cy="662200"/>
           </a:xfrm>
           <a:prstGeom prst="straightConnector1">
@@ -3713,7 +4150,7 @@
         </p:nvCxnSpPr>
         <p:spPr>
           <a:xfrm flipV="1">
-            <a:off x="4993140" y="1113017"/>
+            <a:off x="5116965" y="1113017"/>
             <a:ext cx="0" cy="675425"/>
           </a:xfrm>
           <a:prstGeom prst="straightConnector1">
@@ -3750,7 +4187,7 @@
         </p:nvCxnSpPr>
         <p:spPr>
           <a:xfrm flipV="1">
-            <a:off x="4619805" y="3036500"/>
+            <a:off x="4743630" y="3036500"/>
             <a:ext cx="0" cy="675367"/>
           </a:xfrm>
           <a:prstGeom prst="straightConnector1">
@@ -3787,7 +4224,7 @@
         </p:nvCxnSpPr>
         <p:spPr>
           <a:xfrm flipH="1" flipV="1">
-            <a:off x="4993140" y="3036500"/>
+            <a:off x="5116965" y="3036500"/>
             <a:ext cx="738" cy="675369"/>
           </a:xfrm>
           <a:prstGeom prst="straightConnector1">
@@ -3827,7 +4264,7 @@
         </p:nvCxnSpPr>
         <p:spPr>
           <a:xfrm>
-            <a:off x="5819228" y="1973107"/>
+            <a:off x="5943053" y="1973107"/>
             <a:ext cx="1274733" cy="10054"/>
           </a:xfrm>
           <a:prstGeom prst="straightConnector1">
@@ -3863,7 +4300,7 @@
         </p:nvCxnSpPr>
         <p:spPr>
           <a:xfrm flipV="1">
-            <a:off x="4619805" y="4993141"/>
+            <a:off x="4743630" y="4993141"/>
             <a:ext cx="0" cy="649618"/>
           </a:xfrm>
           <a:prstGeom prst="straightConnector1">
@@ -3900,7 +4337,7 @@
         </p:nvCxnSpPr>
         <p:spPr>
           <a:xfrm flipV="1">
-            <a:off x="4993878" y="4993141"/>
+            <a:off x="5117703" y="4993141"/>
             <a:ext cx="0" cy="649618"/>
           </a:xfrm>
           <a:prstGeom prst="straightConnector1">
@@ -3940,7 +4377,7 @@
         </p:nvCxnSpPr>
         <p:spPr>
           <a:xfrm>
-            <a:off x="5871774" y="5827425"/>
+            <a:off x="5995599" y="5827425"/>
             <a:ext cx="1331221" cy="0"/>
           </a:xfrm>
           <a:prstGeom prst="straightConnector1">
@@ -3979,7 +4416,7 @@
         </p:nvCxnSpPr>
         <p:spPr>
           <a:xfrm>
-            <a:off x="5819228" y="913442"/>
+            <a:off x="5943053" y="913442"/>
             <a:ext cx="4121339" cy="4913983"/>
           </a:xfrm>
           <a:prstGeom prst="bentConnector3">
@@ -4021,7 +4458,7 @@
         </p:nvCxnSpPr>
         <p:spPr>
           <a:xfrm rot="5400000">
-            <a:off x="7037476" y="1276654"/>
+            <a:off x="7161301" y="1276654"/>
             <a:ext cx="341734" cy="2778808"/>
           </a:xfrm>
           <a:prstGeom prst="bentConnector2">
@@ -4060,7 +4497,7 @@
         </p:nvCxnSpPr>
         <p:spPr>
           <a:xfrm rot="5400000">
-            <a:off x="7036210" y="3246937"/>
+            <a:off x="7160035" y="3246937"/>
             <a:ext cx="397103" cy="2725973"/>
           </a:xfrm>
           <a:prstGeom prst="bentConnector2">
@@ -4096,7 +4533,7 @@
         </p:nvSpPr>
         <p:spPr>
           <a:xfrm>
-            <a:off x="6208458" y="1737251"/>
+            <a:off x="6332283" y="1737251"/>
             <a:ext cx="648896" cy="276999"/>
           </a:xfrm>
           <a:prstGeom prst="rect">
@@ -4126,7 +4563,7 @@
         </p:nvSpPr>
         <p:spPr>
           <a:xfrm>
-            <a:off x="6212936" y="3655331"/>
+            <a:off x="6336761" y="3655331"/>
             <a:ext cx="648896" cy="276999"/>
           </a:xfrm>
           <a:prstGeom prst="rect">
@@ -4156,7 +4593,7 @@
         </p:nvSpPr>
         <p:spPr>
           <a:xfrm>
-            <a:off x="7469907" y="4806021"/>
+            <a:off x="7593732" y="4806021"/>
             <a:ext cx="1012970" cy="276999"/>
           </a:xfrm>
           <a:prstGeom prst="rect">
@@ -4186,7 +4623,7 @@
         </p:nvSpPr>
         <p:spPr>
           <a:xfrm>
-            <a:off x="7469907" y="659758"/>
+            <a:off x="7593732" y="659758"/>
             <a:ext cx="1012970" cy="276999"/>
           </a:xfrm>
           <a:prstGeom prst="rect">
@@ -4216,7 +4653,7 @@
         </p:nvSpPr>
         <p:spPr>
           <a:xfrm>
-            <a:off x="6215743" y="5573752"/>
+            <a:off x="6339568" y="5573752"/>
             <a:ext cx="648896" cy="276999"/>
           </a:xfrm>
           <a:prstGeom prst="rect">
@@ -4246,7 +4683,7 @@
         </p:nvSpPr>
         <p:spPr>
           <a:xfrm>
-            <a:off x="7469907" y="2818988"/>
+            <a:off x="7593732" y="2818988"/>
             <a:ext cx="1012970" cy="276999"/>
           </a:xfrm>
           <a:prstGeom prst="rect">
@@ -4276,7 +4713,7 @@
         </p:nvSpPr>
         <p:spPr>
           <a:xfrm rot="16200000">
-            <a:off x="4158853" y="3282385"/>
+            <a:off x="4282678" y="3282385"/>
             <a:ext cx="635110" cy="276999"/>
           </a:xfrm>
           <a:prstGeom prst="rect">
@@ -4306,7 +4743,7 @@
         </p:nvSpPr>
         <p:spPr>
           <a:xfrm>
-            <a:off x="2634636" y="640324"/>
+            <a:off x="2758461" y="640324"/>
             <a:ext cx="540000" cy="540000"/>
           </a:xfrm>
           <a:prstGeom prst="ellipse">
@@ -4354,7 +4791,7 @@
         </p:nvSpPr>
         <p:spPr>
           <a:xfrm>
-            <a:off x="1236157" y="3606584"/>
+            <a:off x="378102" y="3628865"/>
             <a:ext cx="540000" cy="540000"/>
           </a:xfrm>
           <a:prstGeom prst="ellipse">
@@ -4400,7 +4837,7 @@
         </p:nvSpPr>
         <p:spPr>
           <a:xfrm>
-            <a:off x="1322507" y="3698917"/>
+            <a:off x="464452" y="3721198"/>
             <a:ext cx="360000" cy="360000"/>
           </a:xfrm>
           <a:prstGeom prst="ellipse">
@@ -4451,8 +4888,8 @@
         </p:nvCxnSpPr>
         <p:spPr>
           <a:xfrm rot="10800000" flipV="1">
-            <a:off x="1506158" y="1973106"/>
-            <a:ext cx="2310087" cy="1633477"/>
+            <a:off x="648103" y="1973107"/>
+            <a:ext cx="3291967" cy="1655758"/>
           </a:xfrm>
           <a:prstGeom prst="bentConnector2">
             <a:avLst/>
@@ -4490,8 +4927,8 @@
         </p:nvCxnSpPr>
         <p:spPr>
           <a:xfrm rot="10800000">
-            <a:off x="1506158" y="4146585"/>
-            <a:ext cx="2256385" cy="1680841"/>
+            <a:off x="648103" y="4168865"/>
+            <a:ext cx="3238265" cy="1658560"/>
           </a:xfrm>
           <a:prstGeom prst="bentConnector2">
             <a:avLst/>
@@ -4528,9 +4965,9 @@
           <p:nvPr/>
         </p:nvCxnSpPr>
         <p:spPr>
-          <a:xfrm flipH="1" flipV="1">
-            <a:off x="1776157" y="3876584"/>
-            <a:ext cx="1986385" cy="19948"/>
+          <a:xfrm flipH="1">
+            <a:off x="918102" y="3896532"/>
+            <a:ext cx="2968265" cy="2333"/>
           </a:xfrm>
           <a:prstGeom prst="straightConnector1">
             <a:avLst/>
@@ -4568,7 +5005,7 @@
         </p:nvCxnSpPr>
         <p:spPr>
           <a:xfrm>
-            <a:off x="3174636" y="910324"/>
+            <a:off x="3298461" y="910324"/>
             <a:ext cx="641608" cy="3118"/>
           </a:xfrm>
           <a:prstGeom prst="straightConnector1">
@@ -4607,7 +5044,7 @@
         </p:nvCxnSpPr>
         <p:spPr>
           <a:xfrm rot="16200000" flipH="1">
-            <a:off x="2531706" y="1553253"/>
+            <a:off x="2655531" y="1553253"/>
             <a:ext cx="1656601" cy="910741"/>
           </a:xfrm>
           <a:prstGeom prst="bentConnector2">
@@ -4646,7 +5083,7 @@
         </p:nvCxnSpPr>
         <p:spPr>
           <a:xfrm rot="16200000" flipH="1">
-            <a:off x="1519803" y="2565157"/>
+            <a:off x="1643628" y="2565157"/>
             <a:ext cx="3628151" cy="858484"/>
           </a:xfrm>
           <a:prstGeom prst="bentConnector2">
@@ -4682,7 +5119,7 @@
         </p:nvSpPr>
         <p:spPr>
           <a:xfrm>
-            <a:off x="1739538" y="5555262"/>
+            <a:off x="1213246" y="5566610"/>
             <a:ext cx="1516954" cy="276999"/>
           </a:xfrm>
           <a:prstGeom prst="rect">
@@ -4712,8 +5149,8 @@
         </p:nvSpPr>
         <p:spPr>
           <a:xfrm>
-            <a:off x="1505051" y="1983161"/>
-            <a:ext cx="924164" cy="461665"/>
+            <a:off x="1214805" y="1973006"/>
+            <a:ext cx="1516954" cy="276999"/>
           </a:xfrm>
           <a:prstGeom prst="rect">
             <a:avLst/>
@@ -4730,8 +5167,14 @@
               <a:rPr lang="de-DE" sz="1200" dirty="0" smtClean="0"/>
               <a:t>desiccation </a:t>
             </a:r>
-          </a:p>
-          <a:p>
+            <a:r>
+              <a:rPr lang="de-DE" sz="1200" dirty="0" smtClean="0"/>
+              <a:t>/</a:t>
+            </a:r>
+            <a:r>
+              <a:rPr lang="de-DE" sz="1200" dirty="0"/>
+              <a:t> </a:t>
+            </a:r>
             <a:r>
               <a:rPr lang="de-DE" sz="1200" dirty="0" smtClean="0"/>
               <a:t>freezing</a:t>
@@ -4748,8 +5191,8 @@
         </p:nvSpPr>
         <p:spPr>
           <a:xfrm>
-            <a:off x="1900232" y="3876584"/>
-            <a:ext cx="924164" cy="461665"/>
+            <a:off x="1209074" y="3912995"/>
+            <a:ext cx="1516954" cy="276999"/>
           </a:xfrm>
           <a:prstGeom prst="rect">
             <a:avLst/>
@@ -4766,11 +5209,9 @@
               <a:rPr lang="de-DE" sz="1200" dirty="0" smtClean="0"/>
               <a:t>desiccation </a:t>
             </a:r>
-          </a:p>
-          <a:p>
             <a:r>
               <a:rPr lang="de-DE" sz="1200" dirty="0" smtClean="0"/>
-              <a:t>freezing</a:t>
+              <a:t>/ freezing</a:t>
             </a:r>
             <a:endParaRPr lang="de-DE" sz="1200" dirty="0"/>
           </a:p>
@@ -4784,7 +5225,7 @@
         </p:nvSpPr>
         <p:spPr>
           <a:xfrm>
-            <a:off x="2237080" y="318760"/>
+            <a:off x="2362314" y="307056"/>
             <a:ext cx="1335109" cy="369332"/>
           </a:xfrm>
           <a:prstGeom prst="rect">
@@ -4814,7 +5255,7 @@
         </p:nvSpPr>
         <p:spPr>
           <a:xfrm rot="16200000">
-            <a:off x="718107" y="3701892"/>
+            <a:off x="-139948" y="3724173"/>
             <a:ext cx="750014" cy="369332"/>
           </a:xfrm>
           <a:prstGeom prst="rect">
@@ -4844,7 +5285,7 @@
         </p:nvSpPr>
         <p:spPr>
           <a:xfrm rot="16200000">
-            <a:off x="4163173" y="5228471"/>
+            <a:off x="4286998" y="5228471"/>
             <a:ext cx="635110" cy="276999"/>
           </a:xfrm>
           <a:prstGeom prst="rect">
@@ -4874,7 +5315,7 @@
         </p:nvSpPr>
         <p:spPr>
           <a:xfrm rot="16200000">
-            <a:off x="4168089" y="1371032"/>
+            <a:off x="4291914" y="1371032"/>
             <a:ext cx="635110" cy="276999"/>
           </a:xfrm>
           <a:prstGeom prst="rect">
@@ -4896,16 +5337,187 @@
           </a:p>
         </p:txBody>
       </p:sp>
+      <p:sp>
+        <p:nvSpPr>
+          <p:cNvPr id="18" name="Abgerundetes Rechteck 17"/>
+          <p:cNvSpPr/>
+          <p:nvPr/>
+        </p:nvSpPr>
+        <p:spPr>
+          <a:xfrm>
+            <a:off x="649118" y="609835"/>
+            <a:ext cx="1515291" cy="1178505"/>
+          </a:xfrm>
+          <a:prstGeom prst="roundRect">
+            <a:avLst/>
+          </a:prstGeom>
+          <a:noFill/>
+          <a:ln w="19050">
+            <a:solidFill>
+              <a:schemeClr val="tx1"/>
+            </a:solidFill>
+            <a:prstDash val="sysDash"/>
+          </a:ln>
+        </p:spPr>
+        <p:style>
+          <a:lnRef idx="2">
+            <a:schemeClr val="accent1">
+              <a:shade val="50000"/>
+            </a:schemeClr>
+          </a:lnRef>
+          <a:fillRef idx="1">
+            <a:schemeClr val="accent1"/>
+          </a:fillRef>
+          <a:effectRef idx="0">
+            <a:schemeClr val="accent1"/>
+          </a:effectRef>
+          <a:fontRef idx="minor">
+            <a:schemeClr val="lt1"/>
+          </a:fontRef>
+        </p:style>
+        <p:txBody>
+          <a:bodyPr rtlCol="0" anchor="ctr"/>
+          <a:lstStyle/>
+          <a:p>
+            <a:pPr algn="ctr"/>
+            <a:endParaRPr lang="de-DE"/>
+          </a:p>
+        </p:txBody>
+      </p:sp>
+      <p:cxnSp>
+        <p:nvCxnSpPr>
+          <p:cNvPr id="65" name="Gerade Verbindung mit Pfeil 64"/>
+          <p:cNvCxnSpPr>
+            <a:endCxn id="80" idx="2"/>
+          </p:cNvCxnSpPr>
+          <p:nvPr/>
+        </p:nvCxnSpPr>
+        <p:spPr>
+          <a:xfrm flipV="1">
+            <a:off x="2181225" y="910324"/>
+            <a:ext cx="577236" cy="4076"/>
+          </a:xfrm>
+          <a:prstGeom prst="straightConnector1">
+            <a:avLst/>
+          </a:prstGeom>
+          <a:ln w="38100">
+            <a:solidFill>
+              <a:schemeClr val="tx1"/>
+            </a:solidFill>
+            <a:tailEnd type="triangle"/>
+          </a:ln>
+        </p:spPr>
+        <p:style>
+          <a:lnRef idx="1">
+            <a:schemeClr val="accent1"/>
+          </a:lnRef>
+          <a:fillRef idx="0">
+            <a:schemeClr val="accent1"/>
+          </a:fillRef>
+          <a:effectRef idx="0">
+            <a:schemeClr val="accent1"/>
+          </a:effectRef>
+          <a:fontRef idx="minor">
+            <a:schemeClr val="tx1"/>
+          </a:fontRef>
+        </p:style>
+      </p:cxnSp>
+      <p:sp>
+        <p:nvSpPr>
+          <p:cNvPr id="28" name="Textfeld 27"/>
+          <p:cNvSpPr txBox="1"/>
+          <p:nvPr/>
+        </p:nvSpPr>
+        <p:spPr>
+          <a:xfrm>
+            <a:off x="772786" y="577178"/>
+            <a:ext cx="1339406" cy="1246495"/>
+          </a:xfrm>
+          <a:prstGeom prst="rect">
+            <a:avLst/>
+          </a:prstGeom>
+          <a:noFill/>
+        </p:spPr>
+        <p:txBody>
+          <a:bodyPr wrap="none" rtlCol="0">
+            <a:spAutoFit/>
+          </a:bodyPr>
+          <a:lstStyle/>
+          <a:p>
+            <a:pPr>
+              <a:lnSpc>
+                <a:spcPts val="1800"/>
+              </a:lnSpc>
+            </a:pPr>
+            <a:r>
+              <a:rPr lang="en-GB" sz="1200" dirty="0" smtClean="0"/>
+              <a:t>minTemperature</a:t>
+            </a:r>
+          </a:p>
+          <a:p>
+            <a:pPr>
+              <a:lnSpc>
+                <a:spcPts val="1800"/>
+              </a:lnSpc>
+            </a:pPr>
+            <a:r>
+              <a:rPr lang="en-GB" sz="1200" dirty="0" smtClean="0"/>
+              <a:t>maxTemperature</a:t>
+            </a:r>
+          </a:p>
+          <a:p>
+            <a:pPr>
+              <a:lnSpc>
+                <a:spcPts val="1800"/>
+              </a:lnSpc>
+            </a:pPr>
+            <a:r>
+              <a:rPr lang="en-GB" sz="1200" dirty="0" smtClean="0"/>
+              <a:t>meanTemperature</a:t>
+            </a:r>
+          </a:p>
+          <a:p>
+            <a:pPr>
+              <a:lnSpc>
+                <a:spcPts val="1800"/>
+              </a:lnSpc>
+            </a:pPr>
+            <a:r>
+              <a:rPr lang="en-GB" sz="1200" dirty="0" smtClean="0"/>
+              <a:t>relativeHumidity</a:t>
+            </a:r>
+          </a:p>
+          <a:p>
+            <a:pPr>
+              <a:lnSpc>
+                <a:spcPts val="1800"/>
+              </a:lnSpc>
+            </a:pPr>
+            <a:r>
+              <a:rPr lang="en-GB" sz="1200" dirty="0" smtClean="0"/>
+              <a:t>fructificationIndex</a:t>
+            </a:r>
+            <a:endParaRPr lang="en-GB" sz="1200" dirty="0"/>
+          </a:p>
+        </p:txBody>
+      </p:sp>
     </p:spTree>
     <p:extLst>
       <p:ext uri="{BB962C8B-B14F-4D97-AF65-F5344CB8AC3E}">
-        <p14:creationId xmlns:p14="http://schemas.microsoft.com/office/powerpoint/2010/main" val="4206954826"/>
+        <p14:creationId xmlns:p14="http://schemas.microsoft.com/office/powerpoint/2010/main" val="1486755628"/>
       </p:ext>
     </p:extLst>
   </p:cSld>
   <p:clrMapOvr>
     <a:masterClrMapping/>
   </p:clrMapOvr>
+  <p:timing>
+    <p:tnLst>
+      <p:par>
+        <p:cTn id="1" dur="indefinite" restart="never" nodeType="tmRoot"/>
+      </p:par>
+    </p:tnLst>
+  </p:timing>
 </p:sld>
 </file>
 
@@ -5168,4 +5780,265 @@
     </a:ext>
   </a:extLst>
 </a:theme>
+</file>
+
+<file path=ppt/theme/theme2.xml><?xml version="1.0" encoding="utf-8"?>
+<a:theme xmlns:a="http://schemas.openxmlformats.org/drawingml/2006/main" name="Office Theme">
+  <a:themeElements>
+    <a:clrScheme name="Office">
+      <a:dk1>
+        <a:sysClr val="windowText" lastClr="000000"/>
+      </a:dk1>
+      <a:lt1>
+        <a:sysClr val="window" lastClr="FFFFFF"/>
+      </a:lt1>
+      <a:dk2>
+        <a:srgbClr val="44546A"/>
+      </a:dk2>
+      <a:lt2>
+        <a:srgbClr val="E7E6E6"/>
+      </a:lt2>
+      <a:accent1>
+        <a:srgbClr val="5B9BD5"/>
+      </a:accent1>
+      <a:accent2>
+        <a:srgbClr val="ED7D31"/>
+      </a:accent2>
+      <a:accent3>
+        <a:srgbClr val="A5A5A5"/>
+      </a:accent3>
+      <a:accent4>
+        <a:srgbClr val="FFC000"/>
+      </a:accent4>
+      <a:accent5>
+        <a:srgbClr val="4472C4"/>
+      </a:accent5>
+      <a:accent6>
+        <a:srgbClr val="70AD47"/>
+      </a:accent6>
+      <a:hlink>
+        <a:srgbClr val="0563C1"/>
+      </a:hlink>
+      <a:folHlink>
+        <a:srgbClr val="954F72"/>
+      </a:folHlink>
+    </a:clrScheme>
+    <a:fontScheme name="Office">
+      <a:majorFont>
+        <a:latin typeface="Calibri Light" panose="020F0302020204030204"/>
+        <a:ea typeface=""/>
+        <a:cs typeface=""/>
+        <a:font script="Jpan" typeface="ＭＳ Ｐゴシック"/>
+        <a:font script="Hang" typeface="맑은 고딕"/>
+        <a:font script="Hans" typeface="宋体"/>
+        <a:font script="Hant" typeface="新細明體"/>
+        <a:font script="Arab" typeface="Times New Roman"/>
+        <a:font script="Hebr" typeface="Times New Roman"/>
+        <a:font script="Thai" typeface="Angsana New"/>
+        <a:font script="Ethi" typeface="Nyala"/>
+        <a:font script="Beng" typeface="Vrinda"/>
+        <a:font script="Gujr" typeface="Shruti"/>
+        <a:font script="Khmr" typeface="MoolBoran"/>
+        <a:font script="Knda" typeface="Tunga"/>
+        <a:font script="Guru" typeface="Raavi"/>
+        <a:font script="Cans" typeface="Euphemia"/>
+        <a:font script="Cher" typeface="Plantagenet Cherokee"/>
+        <a:font script="Yiii" typeface="Microsoft Yi Baiti"/>
+        <a:font script="Tibt" typeface="Microsoft Himalaya"/>
+        <a:font script="Thaa" typeface="MV Boli"/>
+        <a:font script="Deva" typeface="Mangal"/>
+        <a:font script="Telu" typeface="Gautami"/>
+        <a:font script="Taml" typeface="Latha"/>
+        <a:font script="Syrc" typeface="Estrangelo Edessa"/>
+        <a:font script="Orya" typeface="Kalinga"/>
+        <a:font script="Mlym" typeface="Kartika"/>
+        <a:font script="Laoo" typeface="DokChampa"/>
+        <a:font script="Sinh" typeface="Iskoola Pota"/>
+        <a:font script="Mong" typeface="Mongolian Baiti"/>
+        <a:font script="Viet" typeface="Times New Roman"/>
+        <a:font script="Uigh" typeface="Microsoft Uighur"/>
+        <a:font script="Geor" typeface="Sylfaen"/>
+      </a:majorFont>
+      <a:minorFont>
+        <a:latin typeface="Calibri" panose="020F0502020204030204"/>
+        <a:ea typeface=""/>
+        <a:cs typeface=""/>
+        <a:font script="Jpan" typeface="ＭＳ Ｐゴシック"/>
+        <a:font script="Hang" typeface="맑은 고딕"/>
+        <a:font script="Hans" typeface="宋体"/>
+        <a:font script="Hant" typeface="新細明體"/>
+        <a:font script="Arab" typeface="Arial"/>
+        <a:font script="Hebr" typeface="Arial"/>
+        <a:font script="Thai" typeface="Cordia New"/>
+        <a:font script="Ethi" typeface="Nyala"/>
+        <a:font script="Beng" typeface="Vrinda"/>
+        <a:font script="Gujr" typeface="Shruti"/>
+        <a:font script="Khmr" typeface="DaunPenh"/>
+        <a:font script="Knda" typeface="Tunga"/>
+        <a:font script="Guru" typeface="Raavi"/>
+        <a:font script="Cans" typeface="Euphemia"/>
+        <a:font script="Cher" typeface="Plantagenet Cherokee"/>
+        <a:font script="Yiii" typeface="Microsoft Yi Baiti"/>
+        <a:font script="Tibt" typeface="Microsoft Himalaya"/>
+        <a:font script="Thaa" typeface="MV Boli"/>
+        <a:font script="Deva" typeface="Mangal"/>
+        <a:font script="Telu" typeface="Gautami"/>
+        <a:font script="Taml" typeface="Latha"/>
+        <a:font script="Syrc" typeface="Estrangelo Edessa"/>
+        <a:font script="Orya" typeface="Kalinga"/>
+        <a:font script="Mlym" typeface="Kartika"/>
+        <a:font script="Laoo" typeface="DokChampa"/>
+        <a:font script="Sinh" typeface="Iskoola Pota"/>
+        <a:font script="Mong" typeface="Mongolian Baiti"/>
+        <a:font script="Viet" typeface="Arial"/>
+        <a:font script="Uigh" typeface="Microsoft Uighur"/>
+        <a:font script="Geor" typeface="Sylfaen"/>
+      </a:minorFont>
+    </a:fontScheme>
+    <a:fmtScheme name="Office">
+      <a:fillStyleLst>
+        <a:solidFill>
+          <a:schemeClr val="phClr"/>
+        </a:solidFill>
+        <a:gradFill rotWithShape="1">
+          <a:gsLst>
+            <a:gs pos="0">
+              <a:schemeClr val="phClr">
+                <a:lumMod val="110000"/>
+                <a:satMod val="105000"/>
+                <a:tint val="67000"/>
+              </a:schemeClr>
+            </a:gs>
+            <a:gs pos="50000">
+              <a:schemeClr val="phClr">
+                <a:lumMod val="105000"/>
+                <a:satMod val="103000"/>
+                <a:tint val="73000"/>
+              </a:schemeClr>
+            </a:gs>
+            <a:gs pos="100000">
+              <a:schemeClr val="phClr">
+                <a:lumMod val="105000"/>
+                <a:satMod val="109000"/>
+                <a:tint val="81000"/>
+              </a:schemeClr>
+            </a:gs>
+          </a:gsLst>
+          <a:lin ang="5400000" scaled="0"/>
+        </a:gradFill>
+        <a:gradFill rotWithShape="1">
+          <a:gsLst>
+            <a:gs pos="0">
+              <a:schemeClr val="phClr">
+                <a:satMod val="103000"/>
+                <a:lumMod val="102000"/>
+                <a:tint val="94000"/>
+              </a:schemeClr>
+            </a:gs>
+            <a:gs pos="50000">
+              <a:schemeClr val="phClr">
+                <a:satMod val="110000"/>
+                <a:lumMod val="100000"/>
+                <a:shade val="100000"/>
+              </a:schemeClr>
+            </a:gs>
+            <a:gs pos="100000">
+              <a:schemeClr val="phClr">
+                <a:lumMod val="99000"/>
+                <a:satMod val="120000"/>
+                <a:shade val="78000"/>
+              </a:schemeClr>
+            </a:gs>
+          </a:gsLst>
+          <a:lin ang="5400000" scaled="0"/>
+        </a:gradFill>
+      </a:fillStyleLst>
+      <a:lnStyleLst>
+        <a:ln w="6350" cap="flat" cmpd="sng" algn="ctr">
+          <a:solidFill>
+            <a:schemeClr val="phClr"/>
+          </a:solidFill>
+          <a:prstDash val="solid"/>
+          <a:miter lim="800000"/>
+        </a:ln>
+        <a:ln w="12700" cap="flat" cmpd="sng" algn="ctr">
+          <a:solidFill>
+            <a:schemeClr val="phClr"/>
+          </a:solidFill>
+          <a:prstDash val="solid"/>
+          <a:miter lim="800000"/>
+        </a:ln>
+        <a:ln w="19050" cap="flat" cmpd="sng" algn="ctr">
+          <a:solidFill>
+            <a:schemeClr val="phClr"/>
+          </a:solidFill>
+          <a:prstDash val="solid"/>
+          <a:miter lim="800000"/>
+        </a:ln>
+      </a:lnStyleLst>
+      <a:effectStyleLst>
+        <a:effectStyle>
+          <a:effectLst/>
+        </a:effectStyle>
+        <a:effectStyle>
+          <a:effectLst/>
+        </a:effectStyle>
+        <a:effectStyle>
+          <a:effectLst>
+            <a:outerShdw blurRad="57150" dist="19050" dir="5400000" algn="ctr" rotWithShape="0">
+              <a:srgbClr val="000000">
+                <a:alpha val="63000"/>
+              </a:srgbClr>
+            </a:outerShdw>
+          </a:effectLst>
+        </a:effectStyle>
+      </a:effectStyleLst>
+      <a:bgFillStyleLst>
+        <a:solidFill>
+          <a:schemeClr val="phClr"/>
+        </a:solidFill>
+        <a:solidFill>
+          <a:schemeClr val="phClr">
+            <a:tint val="95000"/>
+            <a:satMod val="170000"/>
+          </a:schemeClr>
+        </a:solidFill>
+        <a:gradFill rotWithShape="1">
+          <a:gsLst>
+            <a:gs pos="0">
+              <a:schemeClr val="phClr">
+                <a:tint val="93000"/>
+                <a:satMod val="150000"/>
+                <a:shade val="98000"/>
+                <a:lumMod val="102000"/>
+              </a:schemeClr>
+            </a:gs>
+            <a:gs pos="50000">
+              <a:schemeClr val="phClr">
+                <a:tint val="98000"/>
+                <a:satMod val="130000"/>
+                <a:shade val="90000"/>
+                <a:lumMod val="103000"/>
+              </a:schemeClr>
+            </a:gs>
+            <a:gs pos="100000">
+              <a:schemeClr val="phClr">
+                <a:shade val="63000"/>
+                <a:satMod val="120000"/>
+              </a:schemeClr>
+            </a:gs>
+          </a:gsLst>
+          <a:lin ang="5400000" scaled="0"/>
+        </a:gradFill>
+      </a:bgFillStyleLst>
+    </a:fmtScheme>
+  </a:themeElements>
+  <a:objectDefaults/>
+  <a:extraClrSchemeLst/>
+  <a:extLst>
+    <a:ext uri="{05A4C25C-085E-4340-85A3-A5531E510DB2}">
+      <thm15:themeFamily xmlns:thm15="http://schemas.microsoft.com/office/thememl/2012/main" name="Office Theme" id="{62F939B6-93AF-4DB8-9C6B-D6C7DFDC589F}" vid="{4A3C46E8-61CC-4603-A589-7422A47A8E4A}"/>
+    </a:ext>
+  </a:extLst>
+</a:theme>
 </file>
</xml_diff>